<commit_message>
Adding sparql query document and movie
</commit_message>
<xml_diff>
--- a/Final Presentation - Krishna Arjun.pptx
+++ b/Final Presentation - Krishna Arjun.pptx
@@ -115,6 +115,11 @@
       </a:defRPr>
     </a:lvl9pPr>
   </p:defaultTextStyle>
+  <p:extLst>
+    <p:ext uri="{EFAFB233-063F-42B5-8137-9DF3F51BA10A}">
+      <p15:sldGuideLst xmlns:p15="http://schemas.microsoft.com/office/powerpoint/2012/main"/>
+    </p:ext>
+  </p:extLst>
 </p:presentation>
 </file>
 
@@ -7796,7 +7801,26 @@
           <a:bodyPr/>
           <a:lstStyle/>
           <a:p>
-            <a:endParaRPr lang="en-US"/>
+            <a:r>
+              <a:rPr lang="en-US" dirty="0">
+                <a:solidFill>
+                  <a:schemeClr val="bg1"/>
+                </a:solidFill>
+                <a:hlinkClick r:id="rId2">
+                  <a:extLst>
+                    <a:ext uri="{A12FA001-AC4F-418D-AE19-62706E023703}">
+                      <ahyp:hlinkClr xmlns:ahyp="http://schemas.microsoft.com/office/drawing/2018/hyperlinkcolor" val="tx"/>
+                    </a:ext>
+                  </a:extLst>
+                </a:hlinkClick>
+              </a:rPr>
+              <a:t>https://personal.utdallas.edu/~ssb170006/SWProject/</a:t>
+            </a:r>
+            <a:endParaRPr lang="en-US" dirty="0">
+              <a:solidFill>
+                <a:schemeClr val="bg1"/>
+              </a:solidFill>
+            </a:endParaRPr>
           </a:p>
         </p:txBody>
       </p:sp>

</xml_diff>